<commit_message>
template content type change
</commit_message>
<xml_diff>
--- a/resources/Learning Unit/Learning_unit_content.pptx
+++ b/resources/Learning Unit/Learning_unit_content.pptx
@@ -5,7 +5,7 @@
     <p:sldMasterId id="2147483648" r:id="rId1"/>
   </p:sldMasterIdLst>
   <p:notesMasterIdLst>
-    <p:notesMasterId r:id="rId18"/>
+    <p:notesMasterId r:id="rId16"/>
   </p:notesMasterIdLst>
   <p:sldIdLst>
     <p:sldId id="256" r:id="rId2"/>
@@ -13,17 +13,15 @@
     <p:sldId id="259" r:id="rId4"/>
     <p:sldId id="258" r:id="rId5"/>
     <p:sldId id="257" r:id="rId6"/>
-    <p:sldId id="262" r:id="rId7"/>
-    <p:sldId id="261" r:id="rId8"/>
-    <p:sldId id="263" r:id="rId9"/>
-    <p:sldId id="264" r:id="rId10"/>
-    <p:sldId id="265" r:id="rId11"/>
-    <p:sldId id="266" r:id="rId12"/>
-    <p:sldId id="267" r:id="rId13"/>
-    <p:sldId id="268" r:id="rId14"/>
-    <p:sldId id="271" r:id="rId15"/>
-    <p:sldId id="269" r:id="rId16"/>
-    <p:sldId id="270" r:id="rId17"/>
+    <p:sldId id="263" r:id="rId7"/>
+    <p:sldId id="264" r:id="rId8"/>
+    <p:sldId id="265" r:id="rId9"/>
+    <p:sldId id="266" r:id="rId10"/>
+    <p:sldId id="267" r:id="rId11"/>
+    <p:sldId id="268" r:id="rId12"/>
+    <p:sldId id="271" r:id="rId13"/>
+    <p:sldId id="269" r:id="rId14"/>
+    <p:sldId id="270" r:id="rId15"/>
   </p:sldIdLst>
   <p:sldSz cx="12192000" cy="6858000"/>
   <p:notesSz cx="6858000" cy="9144000"/>
@@ -122,6 +120,11 @@
       </a:defRPr>
     </a:lvl9pPr>
   </p:defaultTextStyle>
+  <p:extLst>
+    <p:ext uri="{EFAFB233-063F-42B5-8137-9DF3F51BA10A}">
+      <p15:sldGuideLst xmlns:p15="http://schemas.microsoft.com/office/powerpoint/2012/main"/>
+    </p:ext>
+  </p:extLst>
 </p:presentation>
 </file>
 
@@ -207,7 +210,7 @@
           <a:p>
             <a:fld id="{20225347-DA62-354D-9445-7292B3660891}" type="datetimeFigureOut">
               <a:rPr lang="en-GB" smtClean="0"/>
-              <a:t>15/07/2023</a:t>
+              <a:t>01/08/2023</a:t>
             </a:fld>
             <a:endParaRPr lang="en-GB"/>
           </a:p>
@@ -705,7 +708,7 @@
           <a:p>
             <a:fld id="{72223323-F9D8-8049-A4EA-64F88A8DC548}" type="datetime1">
               <a:rPr lang="en-US" smtClean="0"/>
-              <a:t>7/15/23</a:t>
+              <a:t>8/1/23</a:t>
             </a:fld>
             <a:endParaRPr lang="en-GB"/>
           </a:p>
@@ -906,7 +909,7 @@
           <a:p>
             <a:fld id="{13C414DB-51F3-6F45-BD06-45B2A41F8A04}" type="datetime1">
               <a:rPr lang="en-US" smtClean="0"/>
-              <a:t>7/15/23</a:t>
+              <a:t>8/1/23</a:t>
             </a:fld>
             <a:endParaRPr lang="en-GB"/>
           </a:p>
@@ -1117,7 +1120,7 @@
           <a:p>
             <a:fld id="{6B9C7947-FFDA-934D-962D-F29DE7673981}" type="datetime1">
               <a:rPr lang="en-US" smtClean="0"/>
-              <a:t>7/15/23</a:t>
+              <a:t>8/1/23</a:t>
             </a:fld>
             <a:endParaRPr lang="en-GB"/>
           </a:p>
@@ -1318,7 +1321,7 @@
           <a:p>
             <a:fld id="{32F894A0-9D35-9748-BD54-62903A696867}" type="datetime1">
               <a:rPr lang="en-US" smtClean="0"/>
-              <a:t>7/15/23</a:t>
+              <a:t>8/1/23</a:t>
             </a:fld>
             <a:endParaRPr lang="en-GB"/>
           </a:p>
@@ -1596,7 +1599,7 @@
           <a:p>
             <a:fld id="{1636B85D-8D36-BB40-B131-BBFAA0595E19}" type="datetime1">
               <a:rPr lang="en-US" smtClean="0"/>
-              <a:t>7/15/23</a:t>
+              <a:t>8/1/23</a:t>
             </a:fld>
             <a:endParaRPr lang="en-GB"/>
           </a:p>
@@ -1864,7 +1867,7 @@
           <a:p>
             <a:fld id="{F1EC1DAE-231C-104E-B907-FA7D68E05A30}" type="datetime1">
               <a:rPr lang="en-US" smtClean="0"/>
-              <a:t>7/15/23</a:t>
+              <a:t>8/1/23</a:t>
             </a:fld>
             <a:endParaRPr lang="en-GB"/>
           </a:p>
@@ -2279,7 +2282,7 @@
           <a:p>
             <a:fld id="{674A06C4-3669-9643-A16D-DF93353005B5}" type="datetime1">
               <a:rPr lang="en-US" smtClean="0"/>
-              <a:t>7/15/23</a:t>
+              <a:t>8/1/23</a:t>
             </a:fld>
             <a:endParaRPr lang="en-GB"/>
           </a:p>
@@ -2423,7 +2426,7 @@
           <a:p>
             <a:fld id="{6F23BB64-8AEF-114F-BA90-F8DF0E004D6A}" type="datetime1">
               <a:rPr lang="en-US" smtClean="0"/>
-              <a:t>7/15/23</a:t>
+              <a:t>8/1/23</a:t>
             </a:fld>
             <a:endParaRPr lang="en-GB"/>
           </a:p>
@@ -2539,7 +2542,7 @@
           <a:p>
             <a:fld id="{56846223-5A8F-3145-948C-CB5950E6DD77}" type="datetime1">
               <a:rPr lang="en-US" smtClean="0"/>
-              <a:t>7/15/23</a:t>
+              <a:t>8/1/23</a:t>
             </a:fld>
             <a:endParaRPr lang="en-GB"/>
           </a:p>
@@ -2853,7 +2856,7 @@
           <a:p>
             <a:fld id="{51F3744F-C18E-1142-BCB0-2BD81804C258}" type="datetime1">
               <a:rPr lang="en-US" smtClean="0"/>
-              <a:t>7/15/23</a:t>
+              <a:t>8/1/23</a:t>
             </a:fld>
             <a:endParaRPr lang="en-GB"/>
           </a:p>
@@ -3144,7 +3147,7 @@
           <a:p>
             <a:fld id="{1D979A4C-2503-E04C-AD80-606A3E85A833}" type="datetime1">
               <a:rPr lang="en-US" smtClean="0"/>
-              <a:t>7/15/23</a:t>
+              <a:t>8/1/23</a:t>
             </a:fld>
             <a:endParaRPr lang="en-GB"/>
           </a:p>
@@ -3388,7 +3391,7 @@
           <a:p>
             <a:fld id="{D2C36D93-1C0A-C440-B005-A902A7C39FF9}" type="datetime1">
               <a:rPr lang="en-US" smtClean="0"/>
-              <a:t>7/15/23</a:t>
+              <a:t>8/1/23</a:t>
             </a:fld>
             <a:endParaRPr lang="en-GB"/>
           </a:p>
@@ -3888,7 +3891,7 @@
           <a:p>
             <a:fld id="{E9CAF522-290C-DD4C-9BA9-D5B7D42BCC6B}" type="datetime1">
               <a:rPr lang="en-US" smtClean="0"/>
-              <a:t>7/15/23</a:t>
+              <a:t>8/1/23</a:t>
             </a:fld>
             <a:endParaRPr lang="en-GB"/>
           </a:p>
@@ -3983,10 +3986,10 @@
       </p:grpSpPr>
       <p:sp>
         <p:nvSpPr>
-          <p:cNvPr id="2" name="Title 1">
-            <a:extLst>
-              <a:ext uri="{FF2B5EF4-FFF2-40B4-BE49-F238E27FC236}">
-                <a16:creationId xmlns:a16="http://schemas.microsoft.com/office/drawing/2014/main" id="{A547E63D-4C71-844B-A424-496C03757606}"/>
+          <p:cNvPr id="7" name="Title 6">
+            <a:extLst>
+              <a:ext uri="{FF2B5EF4-FFF2-40B4-BE49-F238E27FC236}">
+                <a16:creationId xmlns:a16="http://schemas.microsoft.com/office/drawing/2014/main" id="{096C68E0-C74C-F940-87A7-C1033DCC3F4E}"/>
               </a:ext>
             </a:extLst>
           </p:cNvPr>
@@ -4004,25 +4007,25 @@
           <a:p>
             <a:r>
               <a:rPr lang="en-GB" dirty="0"/>
-              <a:t>Example</a:t>
-            </a:r>
-          </a:p>
-        </p:txBody>
-      </p:sp>
-      <p:sp>
-        <p:nvSpPr>
-          <p:cNvPr id="3" name="Content Placeholder 2">
-            <a:extLst>
-              <a:ext uri="{FF2B5EF4-FFF2-40B4-BE49-F238E27FC236}">
-                <a16:creationId xmlns:a16="http://schemas.microsoft.com/office/drawing/2014/main" id="{B5523B50-2D67-5845-96CC-BC2354930DEF}"/>
-              </a:ext>
-            </a:extLst>
-          </p:cNvPr>
-          <p:cNvSpPr>
-            <a:spLocks noGrp="1"/>
-          </p:cNvSpPr>
-          <p:nvPr>
-            <p:ph idx="1"/>
+              <a:t>Wrap-Up</a:t>
+            </a:r>
+          </a:p>
+        </p:txBody>
+      </p:sp>
+      <p:sp>
+        <p:nvSpPr>
+          <p:cNvPr id="8" name="Text Placeholder 7">
+            <a:extLst>
+              <a:ext uri="{FF2B5EF4-FFF2-40B4-BE49-F238E27FC236}">
+                <a16:creationId xmlns:a16="http://schemas.microsoft.com/office/drawing/2014/main" id="{4A7D9E90-E8D2-4E44-AB7D-E304558ADB48}"/>
+              </a:ext>
+            </a:extLst>
+          </p:cNvPr>
+          <p:cNvSpPr>
+            <a:spLocks noGrp="1"/>
+          </p:cNvSpPr>
+          <p:nvPr>
+            <p:ph type="body" idx="1"/>
           </p:nvPr>
         </p:nvSpPr>
         <p:spPr/>
@@ -4039,7 +4042,7 @@
           <p:cNvPr id="4" name="Date Placeholder 3">
             <a:extLst>
               <a:ext uri="{FF2B5EF4-FFF2-40B4-BE49-F238E27FC236}">
-                <a16:creationId xmlns:a16="http://schemas.microsoft.com/office/drawing/2014/main" id="{6AD20448-75EA-B34B-BA3B-69145D18214D}"/>
+                <a16:creationId xmlns:a16="http://schemas.microsoft.com/office/drawing/2014/main" id="{75EF27CD-FBA8-FE49-8ED5-96A0542681CB}"/>
               </a:ext>
             </a:extLst>
           </p:cNvPr>
@@ -4057,7 +4060,7 @@
           <a:p>
             <a:fld id="{32F894A0-9D35-9748-BD54-62903A696867}" type="datetime1">
               <a:rPr lang="en-US" smtClean="0"/>
-              <a:t>7/15/23</a:t>
+              <a:t>8/1/23</a:t>
             </a:fld>
             <a:endParaRPr lang="en-GB"/>
           </a:p>
@@ -4068,7 +4071,7 @@
           <p:cNvPr id="5" name="Footer Placeholder 4">
             <a:extLst>
               <a:ext uri="{FF2B5EF4-FFF2-40B4-BE49-F238E27FC236}">
-                <a16:creationId xmlns:a16="http://schemas.microsoft.com/office/drawing/2014/main" id="{AA3F439F-0A50-F24F-8D90-C3F1A7C7EE37}"/>
+                <a16:creationId xmlns:a16="http://schemas.microsoft.com/office/drawing/2014/main" id="{8DAC49E5-CAF8-B841-8907-D346236FCB1D}"/>
               </a:ext>
             </a:extLst>
           </p:cNvPr>
@@ -4096,7 +4099,7 @@
           <p:cNvPr id="6" name="Slide Number Placeholder 5">
             <a:extLst>
               <a:ext uri="{FF2B5EF4-FFF2-40B4-BE49-F238E27FC236}">
-                <a16:creationId xmlns:a16="http://schemas.microsoft.com/office/drawing/2014/main" id="{0A70E8CC-1EB2-B745-A4DF-DAEB6276F164}"/>
+                <a16:creationId xmlns:a16="http://schemas.microsoft.com/office/drawing/2014/main" id="{73FFCFE9-5E7F-7749-8426-A45B715CC771}"/>
               </a:ext>
             </a:extLst>
           </p:cNvPr>
@@ -4123,7 +4126,7 @@
     </p:spTree>
     <p:extLst>
       <p:ext uri="{BB962C8B-B14F-4D97-AF65-F5344CB8AC3E}">
-        <p14:creationId xmlns:p14="http://schemas.microsoft.com/office/powerpoint/2010/main" val="2093542985"/>
+        <p14:creationId xmlns:p14="http://schemas.microsoft.com/office/powerpoint/2010/main" val="378160904"/>
       </p:ext>
     </p:extLst>
   </p:cSld>
@@ -4152,10 +4155,10 @@
       </p:grpSpPr>
       <p:sp>
         <p:nvSpPr>
-          <p:cNvPr id="2" name="Title 1">
-            <a:extLst>
-              <a:ext uri="{FF2B5EF4-FFF2-40B4-BE49-F238E27FC236}">
-                <a16:creationId xmlns:a16="http://schemas.microsoft.com/office/drawing/2014/main" id="{220426A6-1BD4-DF4E-B069-73996DA9E04D}"/>
+          <p:cNvPr id="7" name="Title 6">
+            <a:extLst>
+              <a:ext uri="{FF2B5EF4-FFF2-40B4-BE49-F238E27FC236}">
+                <a16:creationId xmlns:a16="http://schemas.microsoft.com/office/drawing/2014/main" id="{A3BEFA44-E322-6F40-A5DA-0E4E33624534}"/>
               </a:ext>
             </a:extLst>
           </p:cNvPr>
@@ -4173,17 +4176,17 @@
           <a:p>
             <a:r>
               <a:rPr lang="en-GB" dirty="0"/>
-              <a:t>Activity</a:t>
-            </a:r>
-          </a:p>
-        </p:txBody>
-      </p:sp>
-      <p:sp>
-        <p:nvSpPr>
-          <p:cNvPr id="3" name="Content Placeholder 2">
-            <a:extLst>
-              <a:ext uri="{FF2B5EF4-FFF2-40B4-BE49-F238E27FC236}">
-                <a16:creationId xmlns:a16="http://schemas.microsoft.com/office/drawing/2014/main" id="{23317488-EBEC-0640-B709-52C48BE47CB9}"/>
+              <a:t>Key Takeaways</a:t>
+            </a:r>
+          </a:p>
+        </p:txBody>
+      </p:sp>
+      <p:sp>
+        <p:nvSpPr>
+          <p:cNvPr id="8" name="Content Placeholder 7">
+            <a:extLst>
+              <a:ext uri="{FF2B5EF4-FFF2-40B4-BE49-F238E27FC236}">
+                <a16:creationId xmlns:a16="http://schemas.microsoft.com/office/drawing/2014/main" id="{D8E607B7-A0CC-BF4C-9061-E03B7849079B}"/>
               </a:ext>
             </a:extLst>
           </p:cNvPr>
@@ -4208,7 +4211,7 @@
           <p:cNvPr id="4" name="Date Placeholder 3">
             <a:extLst>
               <a:ext uri="{FF2B5EF4-FFF2-40B4-BE49-F238E27FC236}">
-                <a16:creationId xmlns:a16="http://schemas.microsoft.com/office/drawing/2014/main" id="{F5FAA34B-D379-7449-97DC-4B149AA575B8}"/>
+                <a16:creationId xmlns:a16="http://schemas.microsoft.com/office/drawing/2014/main" id="{2AE57EBC-09E9-2E4B-8AD3-8DA7C84892FC}"/>
               </a:ext>
             </a:extLst>
           </p:cNvPr>
@@ -4224,9 +4227,9 @@
           <a:bodyPr/>
           <a:lstStyle/>
           <a:p>
-            <a:fld id="{32F894A0-9D35-9748-BD54-62903A696867}" type="datetime1">
+            <a:fld id="{1636B85D-8D36-BB40-B131-BBFAA0595E19}" type="datetime1">
               <a:rPr lang="en-US" smtClean="0"/>
-              <a:t>7/15/23</a:t>
+              <a:t>8/1/23</a:t>
             </a:fld>
             <a:endParaRPr lang="en-GB"/>
           </a:p>
@@ -4237,7 +4240,7 @@
           <p:cNvPr id="5" name="Footer Placeholder 4">
             <a:extLst>
               <a:ext uri="{FF2B5EF4-FFF2-40B4-BE49-F238E27FC236}">
-                <a16:creationId xmlns:a16="http://schemas.microsoft.com/office/drawing/2014/main" id="{33492951-90AC-544B-87D2-A85AD96E2D05}"/>
+                <a16:creationId xmlns:a16="http://schemas.microsoft.com/office/drawing/2014/main" id="{2B836183-E5FA-EE42-ACBF-E60ADF3B02EA}"/>
               </a:ext>
             </a:extLst>
           </p:cNvPr>
@@ -4265,7 +4268,7 @@
           <p:cNvPr id="6" name="Slide Number Placeholder 5">
             <a:extLst>
               <a:ext uri="{FF2B5EF4-FFF2-40B4-BE49-F238E27FC236}">
-                <a16:creationId xmlns:a16="http://schemas.microsoft.com/office/drawing/2014/main" id="{B7E70566-0091-C342-AAA5-E54030FAF150}"/>
+                <a16:creationId xmlns:a16="http://schemas.microsoft.com/office/drawing/2014/main" id="{3343CE76-D556-4245-BCF8-5F8D70D284B7}"/>
               </a:ext>
             </a:extLst>
           </p:cNvPr>
@@ -4292,7 +4295,7 @@
     </p:spTree>
     <p:extLst>
       <p:ext uri="{BB962C8B-B14F-4D97-AF65-F5344CB8AC3E}">
-        <p14:creationId xmlns:p14="http://schemas.microsoft.com/office/powerpoint/2010/main" val="3011264620"/>
+        <p14:creationId xmlns:p14="http://schemas.microsoft.com/office/powerpoint/2010/main" val="3596344519"/>
       </p:ext>
     </p:extLst>
   </p:cSld>
@@ -4321,10 +4324,10 @@
       </p:grpSpPr>
       <p:sp>
         <p:nvSpPr>
-          <p:cNvPr id="7" name="Title 6">
-            <a:extLst>
-              <a:ext uri="{FF2B5EF4-FFF2-40B4-BE49-F238E27FC236}">
-                <a16:creationId xmlns:a16="http://schemas.microsoft.com/office/drawing/2014/main" id="{096C68E0-C74C-F940-87A7-C1033DCC3F4E}"/>
+          <p:cNvPr id="2" name="Title 1">
+            <a:extLst>
+              <a:ext uri="{FF2B5EF4-FFF2-40B4-BE49-F238E27FC236}">
+                <a16:creationId xmlns:a16="http://schemas.microsoft.com/office/drawing/2014/main" id="{802CE371-0E1D-7349-A82D-5FD7CCBADCF9}"/>
               </a:ext>
             </a:extLst>
           </p:cNvPr>
@@ -4342,25 +4345,25 @@
           <a:p>
             <a:r>
               <a:rPr lang="en-GB" dirty="0"/>
-              <a:t>Wrap-Up</a:t>
-            </a:r>
-          </a:p>
-        </p:txBody>
-      </p:sp>
-      <p:sp>
-        <p:nvSpPr>
-          <p:cNvPr id="8" name="Text Placeholder 7">
-            <a:extLst>
-              <a:ext uri="{FF2B5EF4-FFF2-40B4-BE49-F238E27FC236}">
-                <a16:creationId xmlns:a16="http://schemas.microsoft.com/office/drawing/2014/main" id="{4A7D9E90-E8D2-4E44-AB7D-E304558ADB48}"/>
-              </a:ext>
-            </a:extLst>
-          </p:cNvPr>
-          <p:cNvSpPr>
-            <a:spLocks noGrp="1"/>
-          </p:cNvSpPr>
-          <p:nvPr>
-            <p:ph type="body" idx="1"/>
+              <a:t>Final Q&amp;A</a:t>
+            </a:r>
+          </a:p>
+        </p:txBody>
+      </p:sp>
+      <p:sp>
+        <p:nvSpPr>
+          <p:cNvPr id="3" name="Content Placeholder 2">
+            <a:extLst>
+              <a:ext uri="{FF2B5EF4-FFF2-40B4-BE49-F238E27FC236}">
+                <a16:creationId xmlns:a16="http://schemas.microsoft.com/office/drawing/2014/main" id="{3AB3D5E7-0E93-124C-8CF8-AE54D69F66BC}"/>
+              </a:ext>
+            </a:extLst>
+          </p:cNvPr>
+          <p:cNvSpPr>
+            <a:spLocks noGrp="1"/>
+          </p:cNvSpPr>
+          <p:nvPr>
+            <p:ph idx="1"/>
           </p:nvPr>
         </p:nvSpPr>
         <p:spPr/>
@@ -4377,7 +4380,7 @@
           <p:cNvPr id="4" name="Date Placeholder 3">
             <a:extLst>
               <a:ext uri="{FF2B5EF4-FFF2-40B4-BE49-F238E27FC236}">
-                <a16:creationId xmlns:a16="http://schemas.microsoft.com/office/drawing/2014/main" id="{75EF27CD-FBA8-FE49-8ED5-96A0542681CB}"/>
+                <a16:creationId xmlns:a16="http://schemas.microsoft.com/office/drawing/2014/main" id="{B36C4736-C8DF-7444-B6B8-4539911C6206}"/>
               </a:ext>
             </a:extLst>
           </p:cNvPr>
@@ -4395,7 +4398,7 @@
           <a:p>
             <a:fld id="{32F894A0-9D35-9748-BD54-62903A696867}" type="datetime1">
               <a:rPr lang="en-US" smtClean="0"/>
-              <a:t>7/15/23</a:t>
+              <a:t>8/1/23</a:t>
             </a:fld>
             <a:endParaRPr lang="en-GB"/>
           </a:p>
@@ -4406,7 +4409,7 @@
           <p:cNvPr id="5" name="Footer Placeholder 4">
             <a:extLst>
               <a:ext uri="{FF2B5EF4-FFF2-40B4-BE49-F238E27FC236}">
-                <a16:creationId xmlns:a16="http://schemas.microsoft.com/office/drawing/2014/main" id="{8DAC49E5-CAF8-B841-8907-D346236FCB1D}"/>
+                <a16:creationId xmlns:a16="http://schemas.microsoft.com/office/drawing/2014/main" id="{12D9F2FC-2E54-8F4F-B608-95A4D782294D}"/>
               </a:ext>
             </a:extLst>
           </p:cNvPr>
@@ -4434,7 +4437,7 @@
           <p:cNvPr id="6" name="Slide Number Placeholder 5">
             <a:extLst>
               <a:ext uri="{FF2B5EF4-FFF2-40B4-BE49-F238E27FC236}">
-                <a16:creationId xmlns:a16="http://schemas.microsoft.com/office/drawing/2014/main" id="{73FFCFE9-5E7F-7749-8426-A45B715CC771}"/>
+                <a16:creationId xmlns:a16="http://schemas.microsoft.com/office/drawing/2014/main" id="{89C59848-5A4A-564C-949E-46CBF238936E}"/>
               </a:ext>
             </a:extLst>
           </p:cNvPr>
@@ -4461,7 +4464,7 @@
     </p:spTree>
     <p:extLst>
       <p:ext uri="{BB962C8B-B14F-4D97-AF65-F5344CB8AC3E}">
-        <p14:creationId xmlns:p14="http://schemas.microsoft.com/office/powerpoint/2010/main" val="378160904"/>
+        <p14:creationId xmlns:p14="http://schemas.microsoft.com/office/powerpoint/2010/main" val="3726185834"/>
       </p:ext>
     </p:extLst>
   </p:cSld>
@@ -4490,10 +4493,10 @@
       </p:grpSpPr>
       <p:sp>
         <p:nvSpPr>
-          <p:cNvPr id="7" name="Title 6">
-            <a:extLst>
-              <a:ext uri="{FF2B5EF4-FFF2-40B4-BE49-F238E27FC236}">
-                <a16:creationId xmlns:a16="http://schemas.microsoft.com/office/drawing/2014/main" id="{A3BEFA44-E322-6F40-A5DA-0E4E33624534}"/>
+          <p:cNvPr id="2" name="Title 1">
+            <a:extLst>
+              <a:ext uri="{FF2B5EF4-FFF2-40B4-BE49-F238E27FC236}">
+                <a16:creationId xmlns:a16="http://schemas.microsoft.com/office/drawing/2014/main" id="{884A5BE6-4050-FC44-B05F-A14561B1D984}"/>
               </a:ext>
             </a:extLst>
           </p:cNvPr>
@@ -4511,17 +4514,17 @@
           <a:p>
             <a:r>
               <a:rPr lang="en-GB" dirty="0"/>
-              <a:t>Key Takeaways</a:t>
-            </a:r>
-          </a:p>
-        </p:txBody>
-      </p:sp>
-      <p:sp>
-        <p:nvSpPr>
-          <p:cNvPr id="8" name="Content Placeholder 7">
-            <a:extLst>
-              <a:ext uri="{FF2B5EF4-FFF2-40B4-BE49-F238E27FC236}">
-                <a16:creationId xmlns:a16="http://schemas.microsoft.com/office/drawing/2014/main" id="{D8E607B7-A0CC-BF4C-9061-E03B7849079B}"/>
+              <a:t>Assessment Information</a:t>
+            </a:r>
+          </a:p>
+        </p:txBody>
+      </p:sp>
+      <p:sp>
+        <p:nvSpPr>
+          <p:cNvPr id="3" name="Content Placeholder 2">
+            <a:extLst>
+              <a:ext uri="{FF2B5EF4-FFF2-40B4-BE49-F238E27FC236}">
+                <a16:creationId xmlns:a16="http://schemas.microsoft.com/office/drawing/2014/main" id="{4532BCCA-722D-924B-A42B-11D6B5C2E7CB}"/>
               </a:ext>
             </a:extLst>
           </p:cNvPr>
@@ -4546,7 +4549,7 @@
           <p:cNvPr id="4" name="Date Placeholder 3">
             <a:extLst>
               <a:ext uri="{FF2B5EF4-FFF2-40B4-BE49-F238E27FC236}">
-                <a16:creationId xmlns:a16="http://schemas.microsoft.com/office/drawing/2014/main" id="{2AE57EBC-09E9-2E4B-8AD3-8DA7C84892FC}"/>
+                <a16:creationId xmlns:a16="http://schemas.microsoft.com/office/drawing/2014/main" id="{EB1BEC7B-F7CB-DE4B-AF6F-A72B54C4A119}"/>
               </a:ext>
             </a:extLst>
           </p:cNvPr>
@@ -4562,9 +4565,9 @@
           <a:bodyPr/>
           <a:lstStyle/>
           <a:p>
-            <a:fld id="{1636B85D-8D36-BB40-B131-BBFAA0595E19}" type="datetime1">
+            <a:fld id="{32F894A0-9D35-9748-BD54-62903A696867}" type="datetime1">
               <a:rPr lang="en-US" smtClean="0"/>
-              <a:t>7/15/23</a:t>
+              <a:t>8/1/23</a:t>
             </a:fld>
             <a:endParaRPr lang="en-GB"/>
           </a:p>
@@ -4575,7 +4578,7 @@
           <p:cNvPr id="5" name="Footer Placeholder 4">
             <a:extLst>
               <a:ext uri="{FF2B5EF4-FFF2-40B4-BE49-F238E27FC236}">
-                <a16:creationId xmlns:a16="http://schemas.microsoft.com/office/drawing/2014/main" id="{2B836183-E5FA-EE42-ACBF-E60ADF3B02EA}"/>
+                <a16:creationId xmlns:a16="http://schemas.microsoft.com/office/drawing/2014/main" id="{F1F6D796-8163-B446-9F5A-036F4FB5D9E1}"/>
               </a:ext>
             </a:extLst>
           </p:cNvPr>
@@ -4603,7 +4606,7 @@
           <p:cNvPr id="6" name="Slide Number Placeholder 5">
             <a:extLst>
               <a:ext uri="{FF2B5EF4-FFF2-40B4-BE49-F238E27FC236}">
-                <a16:creationId xmlns:a16="http://schemas.microsoft.com/office/drawing/2014/main" id="{3343CE76-D556-4245-BCF8-5F8D70D284B7}"/>
+                <a16:creationId xmlns:a16="http://schemas.microsoft.com/office/drawing/2014/main" id="{6C623773-AA2F-A143-8056-3EA68D553A29}"/>
               </a:ext>
             </a:extLst>
           </p:cNvPr>
@@ -4630,7 +4633,7 @@
     </p:spTree>
     <p:extLst>
       <p:ext uri="{BB962C8B-B14F-4D97-AF65-F5344CB8AC3E}">
-        <p14:creationId xmlns:p14="http://schemas.microsoft.com/office/powerpoint/2010/main" val="3596344519"/>
+        <p14:creationId xmlns:p14="http://schemas.microsoft.com/office/powerpoint/2010/main" val="2926980795"/>
       </p:ext>
     </p:extLst>
   </p:cSld>
@@ -4662,7 +4665,7 @@
           <p:cNvPr id="2" name="Title 1">
             <a:extLst>
               <a:ext uri="{FF2B5EF4-FFF2-40B4-BE49-F238E27FC236}">
-                <a16:creationId xmlns:a16="http://schemas.microsoft.com/office/drawing/2014/main" id="{802CE371-0E1D-7349-A82D-5FD7CCBADCF9}"/>
+                <a16:creationId xmlns:a16="http://schemas.microsoft.com/office/drawing/2014/main" id="{DC9B33D5-8BA4-2346-A392-17E09D6D82DF}"/>
               </a:ext>
             </a:extLst>
           </p:cNvPr>
@@ -4680,7 +4683,7 @@
           <a:p>
             <a:r>
               <a:rPr lang="en-GB" dirty="0"/>
-              <a:t>Final Q&amp;A</a:t>
+              <a:t>Feedback</a:t>
             </a:r>
           </a:p>
         </p:txBody>
@@ -4690,7 +4693,7 @@
           <p:cNvPr id="3" name="Content Placeholder 2">
             <a:extLst>
               <a:ext uri="{FF2B5EF4-FFF2-40B4-BE49-F238E27FC236}">
-                <a16:creationId xmlns:a16="http://schemas.microsoft.com/office/drawing/2014/main" id="{3AB3D5E7-0E93-124C-8CF8-AE54D69F66BC}"/>
+                <a16:creationId xmlns:a16="http://schemas.microsoft.com/office/drawing/2014/main" id="{4044A44C-54ED-5249-B487-2F47CC94CB2B}"/>
               </a:ext>
             </a:extLst>
           </p:cNvPr>
@@ -4706,7 +4709,7 @@
           <a:bodyPr/>
           <a:lstStyle/>
           <a:p>
-            <a:endParaRPr lang="en-GB"/>
+            <a:endParaRPr lang="en-GB" dirty="0"/>
           </a:p>
         </p:txBody>
       </p:sp>
@@ -4715,7 +4718,7 @@
           <p:cNvPr id="4" name="Date Placeholder 3">
             <a:extLst>
               <a:ext uri="{FF2B5EF4-FFF2-40B4-BE49-F238E27FC236}">
-                <a16:creationId xmlns:a16="http://schemas.microsoft.com/office/drawing/2014/main" id="{B36C4736-C8DF-7444-B6B8-4539911C6206}"/>
+                <a16:creationId xmlns:a16="http://schemas.microsoft.com/office/drawing/2014/main" id="{44F4C80C-6171-CD46-AF39-5810AAB313A5}"/>
               </a:ext>
             </a:extLst>
           </p:cNvPr>
@@ -4733,7 +4736,7 @@
           <a:p>
             <a:fld id="{32F894A0-9D35-9748-BD54-62903A696867}" type="datetime1">
               <a:rPr lang="en-US" smtClean="0"/>
-              <a:t>7/15/23</a:t>
+              <a:t>8/1/23</a:t>
             </a:fld>
             <a:endParaRPr lang="en-GB"/>
           </a:p>
@@ -4744,7 +4747,7 @@
           <p:cNvPr id="5" name="Footer Placeholder 4">
             <a:extLst>
               <a:ext uri="{FF2B5EF4-FFF2-40B4-BE49-F238E27FC236}">
-                <a16:creationId xmlns:a16="http://schemas.microsoft.com/office/drawing/2014/main" id="{12D9F2FC-2E54-8F4F-B608-95A4D782294D}"/>
+                <a16:creationId xmlns:a16="http://schemas.microsoft.com/office/drawing/2014/main" id="{C420D405-35CB-C24E-875D-E9EF03E7F9D7}"/>
               </a:ext>
             </a:extLst>
           </p:cNvPr>
@@ -4772,7 +4775,7 @@
           <p:cNvPr id="6" name="Slide Number Placeholder 5">
             <a:extLst>
               <a:ext uri="{FF2B5EF4-FFF2-40B4-BE49-F238E27FC236}">
-                <a16:creationId xmlns:a16="http://schemas.microsoft.com/office/drawing/2014/main" id="{89C59848-5A4A-564C-949E-46CBF238936E}"/>
+                <a16:creationId xmlns:a16="http://schemas.microsoft.com/office/drawing/2014/main" id="{2399C720-5029-6C48-82DF-503914B9CD31}"/>
               </a:ext>
             </a:extLst>
           </p:cNvPr>
@@ -4791,344 +4794,6 @@
             <a:fld id="{5DEEC3C3-520A-B94D-A30E-5ACCEB55592B}" type="slidenum">
               <a:rPr lang="en-GB" smtClean="0"/>
               <a:t>14</a:t>
-            </a:fld>
-            <a:endParaRPr lang="en-GB"/>
-          </a:p>
-        </p:txBody>
-      </p:sp>
-    </p:spTree>
-    <p:extLst>
-      <p:ext uri="{BB962C8B-B14F-4D97-AF65-F5344CB8AC3E}">
-        <p14:creationId xmlns:p14="http://schemas.microsoft.com/office/powerpoint/2010/main" val="3726185834"/>
-      </p:ext>
-    </p:extLst>
-  </p:cSld>
-  <p:clrMapOvr>
-    <a:masterClrMapping/>
-  </p:clrMapOvr>
-</p:sld>
-</file>
-
-<file path=ppt/slides/slide15.xml><?xml version="1.0" encoding="utf-8"?>
-<p:sld xmlns:a="http://schemas.openxmlformats.org/drawingml/2006/main" xmlns:r="http://schemas.openxmlformats.org/officeDocument/2006/relationships" xmlns:p="http://schemas.openxmlformats.org/presentationml/2006/main">
-  <p:cSld>
-    <p:spTree>
-      <p:nvGrpSpPr>
-        <p:cNvPr id="1" name=""/>
-        <p:cNvGrpSpPr/>
-        <p:nvPr/>
-      </p:nvGrpSpPr>
-      <p:grpSpPr>
-        <a:xfrm>
-          <a:off x="0" y="0"/>
-          <a:ext cx="0" cy="0"/>
-          <a:chOff x="0" y="0"/>
-          <a:chExt cx="0" cy="0"/>
-        </a:xfrm>
-      </p:grpSpPr>
-      <p:sp>
-        <p:nvSpPr>
-          <p:cNvPr id="2" name="Title 1">
-            <a:extLst>
-              <a:ext uri="{FF2B5EF4-FFF2-40B4-BE49-F238E27FC236}">
-                <a16:creationId xmlns:a16="http://schemas.microsoft.com/office/drawing/2014/main" id="{884A5BE6-4050-FC44-B05F-A14561B1D984}"/>
-              </a:ext>
-            </a:extLst>
-          </p:cNvPr>
-          <p:cNvSpPr>
-            <a:spLocks noGrp="1"/>
-          </p:cNvSpPr>
-          <p:nvPr>
-            <p:ph type="title"/>
-          </p:nvPr>
-        </p:nvSpPr>
-        <p:spPr/>
-        <p:txBody>
-          <a:bodyPr/>
-          <a:lstStyle/>
-          <a:p>
-            <a:r>
-              <a:rPr lang="en-GB" dirty="0"/>
-              <a:t>Assessment Information</a:t>
-            </a:r>
-          </a:p>
-        </p:txBody>
-      </p:sp>
-      <p:sp>
-        <p:nvSpPr>
-          <p:cNvPr id="3" name="Content Placeholder 2">
-            <a:extLst>
-              <a:ext uri="{FF2B5EF4-FFF2-40B4-BE49-F238E27FC236}">
-                <a16:creationId xmlns:a16="http://schemas.microsoft.com/office/drawing/2014/main" id="{4532BCCA-722D-924B-A42B-11D6B5C2E7CB}"/>
-              </a:ext>
-            </a:extLst>
-          </p:cNvPr>
-          <p:cNvSpPr>
-            <a:spLocks noGrp="1"/>
-          </p:cNvSpPr>
-          <p:nvPr>
-            <p:ph idx="1"/>
-          </p:nvPr>
-        </p:nvSpPr>
-        <p:spPr/>
-        <p:txBody>
-          <a:bodyPr/>
-          <a:lstStyle/>
-          <a:p>
-            <a:endParaRPr lang="en-GB"/>
-          </a:p>
-        </p:txBody>
-      </p:sp>
-      <p:sp>
-        <p:nvSpPr>
-          <p:cNvPr id="4" name="Date Placeholder 3">
-            <a:extLst>
-              <a:ext uri="{FF2B5EF4-FFF2-40B4-BE49-F238E27FC236}">
-                <a16:creationId xmlns:a16="http://schemas.microsoft.com/office/drawing/2014/main" id="{EB1BEC7B-F7CB-DE4B-AF6F-A72B54C4A119}"/>
-              </a:ext>
-            </a:extLst>
-          </p:cNvPr>
-          <p:cNvSpPr>
-            <a:spLocks noGrp="1"/>
-          </p:cNvSpPr>
-          <p:nvPr>
-            <p:ph type="dt" sz="half" idx="10"/>
-          </p:nvPr>
-        </p:nvSpPr>
-        <p:spPr/>
-        <p:txBody>
-          <a:bodyPr/>
-          <a:lstStyle/>
-          <a:p>
-            <a:fld id="{32F894A0-9D35-9748-BD54-62903A696867}" type="datetime1">
-              <a:rPr lang="en-US" smtClean="0"/>
-              <a:t>7/15/23</a:t>
-            </a:fld>
-            <a:endParaRPr lang="en-GB"/>
-          </a:p>
-        </p:txBody>
-      </p:sp>
-      <p:sp>
-        <p:nvSpPr>
-          <p:cNvPr id="5" name="Footer Placeholder 4">
-            <a:extLst>
-              <a:ext uri="{FF2B5EF4-FFF2-40B4-BE49-F238E27FC236}">
-                <a16:creationId xmlns:a16="http://schemas.microsoft.com/office/drawing/2014/main" id="{F1F6D796-8163-B446-9F5A-036F4FB5D9E1}"/>
-              </a:ext>
-            </a:extLst>
-          </p:cNvPr>
-          <p:cNvSpPr>
-            <a:spLocks noGrp="1"/>
-          </p:cNvSpPr>
-          <p:nvPr>
-            <p:ph type="ftr" sz="quarter" idx="11"/>
-          </p:nvPr>
-        </p:nvSpPr>
-        <p:spPr/>
-        <p:txBody>
-          <a:bodyPr/>
-          <a:lstStyle/>
-          <a:p>
-            <a:r>
-              <a:rPr lang="en-GB"/>
-              <a:t>Training Location</a:t>
-            </a:r>
-          </a:p>
-        </p:txBody>
-      </p:sp>
-      <p:sp>
-        <p:nvSpPr>
-          <p:cNvPr id="6" name="Slide Number Placeholder 5">
-            <a:extLst>
-              <a:ext uri="{FF2B5EF4-FFF2-40B4-BE49-F238E27FC236}">
-                <a16:creationId xmlns:a16="http://schemas.microsoft.com/office/drawing/2014/main" id="{6C623773-AA2F-A143-8056-3EA68D553A29}"/>
-              </a:ext>
-            </a:extLst>
-          </p:cNvPr>
-          <p:cNvSpPr>
-            <a:spLocks noGrp="1"/>
-          </p:cNvSpPr>
-          <p:nvPr>
-            <p:ph type="sldNum" sz="quarter" idx="12"/>
-          </p:nvPr>
-        </p:nvSpPr>
-        <p:spPr/>
-        <p:txBody>
-          <a:bodyPr/>
-          <a:lstStyle/>
-          <a:p>
-            <a:fld id="{5DEEC3C3-520A-B94D-A30E-5ACCEB55592B}" type="slidenum">
-              <a:rPr lang="en-GB" smtClean="0"/>
-              <a:t>15</a:t>
-            </a:fld>
-            <a:endParaRPr lang="en-GB"/>
-          </a:p>
-        </p:txBody>
-      </p:sp>
-    </p:spTree>
-    <p:extLst>
-      <p:ext uri="{BB962C8B-B14F-4D97-AF65-F5344CB8AC3E}">
-        <p14:creationId xmlns:p14="http://schemas.microsoft.com/office/powerpoint/2010/main" val="2926980795"/>
-      </p:ext>
-    </p:extLst>
-  </p:cSld>
-  <p:clrMapOvr>
-    <a:masterClrMapping/>
-  </p:clrMapOvr>
-</p:sld>
-</file>
-
-<file path=ppt/slides/slide16.xml><?xml version="1.0" encoding="utf-8"?>
-<p:sld xmlns:a="http://schemas.openxmlformats.org/drawingml/2006/main" xmlns:r="http://schemas.openxmlformats.org/officeDocument/2006/relationships" xmlns:p="http://schemas.openxmlformats.org/presentationml/2006/main">
-  <p:cSld>
-    <p:spTree>
-      <p:nvGrpSpPr>
-        <p:cNvPr id="1" name=""/>
-        <p:cNvGrpSpPr/>
-        <p:nvPr/>
-      </p:nvGrpSpPr>
-      <p:grpSpPr>
-        <a:xfrm>
-          <a:off x="0" y="0"/>
-          <a:ext cx="0" cy="0"/>
-          <a:chOff x="0" y="0"/>
-          <a:chExt cx="0" cy="0"/>
-        </a:xfrm>
-      </p:grpSpPr>
-      <p:sp>
-        <p:nvSpPr>
-          <p:cNvPr id="2" name="Title 1">
-            <a:extLst>
-              <a:ext uri="{FF2B5EF4-FFF2-40B4-BE49-F238E27FC236}">
-                <a16:creationId xmlns:a16="http://schemas.microsoft.com/office/drawing/2014/main" id="{DC9B33D5-8BA4-2346-A392-17E09D6D82DF}"/>
-              </a:ext>
-            </a:extLst>
-          </p:cNvPr>
-          <p:cNvSpPr>
-            <a:spLocks noGrp="1"/>
-          </p:cNvSpPr>
-          <p:nvPr>
-            <p:ph type="title"/>
-          </p:nvPr>
-        </p:nvSpPr>
-        <p:spPr/>
-        <p:txBody>
-          <a:bodyPr/>
-          <a:lstStyle/>
-          <a:p>
-            <a:r>
-              <a:rPr lang="en-GB" dirty="0"/>
-              <a:t>Feedback</a:t>
-            </a:r>
-          </a:p>
-        </p:txBody>
-      </p:sp>
-      <p:sp>
-        <p:nvSpPr>
-          <p:cNvPr id="3" name="Content Placeholder 2">
-            <a:extLst>
-              <a:ext uri="{FF2B5EF4-FFF2-40B4-BE49-F238E27FC236}">
-                <a16:creationId xmlns:a16="http://schemas.microsoft.com/office/drawing/2014/main" id="{4044A44C-54ED-5249-B487-2F47CC94CB2B}"/>
-              </a:ext>
-            </a:extLst>
-          </p:cNvPr>
-          <p:cNvSpPr>
-            <a:spLocks noGrp="1"/>
-          </p:cNvSpPr>
-          <p:nvPr>
-            <p:ph idx="1"/>
-          </p:nvPr>
-        </p:nvSpPr>
-        <p:spPr/>
-        <p:txBody>
-          <a:bodyPr/>
-          <a:lstStyle/>
-          <a:p>
-            <a:endParaRPr lang="en-GB" dirty="0"/>
-          </a:p>
-        </p:txBody>
-      </p:sp>
-      <p:sp>
-        <p:nvSpPr>
-          <p:cNvPr id="4" name="Date Placeholder 3">
-            <a:extLst>
-              <a:ext uri="{FF2B5EF4-FFF2-40B4-BE49-F238E27FC236}">
-                <a16:creationId xmlns:a16="http://schemas.microsoft.com/office/drawing/2014/main" id="{44F4C80C-6171-CD46-AF39-5810AAB313A5}"/>
-              </a:ext>
-            </a:extLst>
-          </p:cNvPr>
-          <p:cNvSpPr>
-            <a:spLocks noGrp="1"/>
-          </p:cNvSpPr>
-          <p:nvPr>
-            <p:ph type="dt" sz="half" idx="10"/>
-          </p:nvPr>
-        </p:nvSpPr>
-        <p:spPr/>
-        <p:txBody>
-          <a:bodyPr/>
-          <a:lstStyle/>
-          <a:p>
-            <a:fld id="{32F894A0-9D35-9748-BD54-62903A696867}" type="datetime1">
-              <a:rPr lang="en-US" smtClean="0"/>
-              <a:t>7/15/23</a:t>
-            </a:fld>
-            <a:endParaRPr lang="en-GB"/>
-          </a:p>
-        </p:txBody>
-      </p:sp>
-      <p:sp>
-        <p:nvSpPr>
-          <p:cNvPr id="5" name="Footer Placeholder 4">
-            <a:extLst>
-              <a:ext uri="{FF2B5EF4-FFF2-40B4-BE49-F238E27FC236}">
-                <a16:creationId xmlns:a16="http://schemas.microsoft.com/office/drawing/2014/main" id="{C420D405-35CB-C24E-875D-E9EF03E7F9D7}"/>
-              </a:ext>
-            </a:extLst>
-          </p:cNvPr>
-          <p:cNvSpPr>
-            <a:spLocks noGrp="1"/>
-          </p:cNvSpPr>
-          <p:nvPr>
-            <p:ph type="ftr" sz="quarter" idx="11"/>
-          </p:nvPr>
-        </p:nvSpPr>
-        <p:spPr/>
-        <p:txBody>
-          <a:bodyPr/>
-          <a:lstStyle/>
-          <a:p>
-            <a:r>
-              <a:rPr lang="en-GB"/>
-              <a:t>Training Location</a:t>
-            </a:r>
-          </a:p>
-        </p:txBody>
-      </p:sp>
-      <p:sp>
-        <p:nvSpPr>
-          <p:cNvPr id="6" name="Slide Number Placeholder 5">
-            <a:extLst>
-              <a:ext uri="{FF2B5EF4-FFF2-40B4-BE49-F238E27FC236}">
-                <a16:creationId xmlns:a16="http://schemas.microsoft.com/office/drawing/2014/main" id="{2399C720-5029-6C48-82DF-503914B9CD31}"/>
-              </a:ext>
-            </a:extLst>
-          </p:cNvPr>
-          <p:cNvSpPr>
-            <a:spLocks noGrp="1"/>
-          </p:cNvSpPr>
-          <p:nvPr>
-            <p:ph type="sldNum" sz="quarter" idx="12"/>
-          </p:nvPr>
-        </p:nvSpPr>
-        <p:spPr/>
-        <p:txBody>
-          <a:bodyPr/>
-          <a:lstStyle/>
-          <a:p>
-            <a:fld id="{5DEEC3C3-520A-B94D-A30E-5ACCEB55592B}" type="slidenum">
-              <a:rPr lang="en-GB" smtClean="0"/>
-              <a:t>16</a:t>
             </a:fld>
             <a:endParaRPr lang="en-GB"/>
           </a:p>
@@ -5264,7 +4929,7 @@
           <a:p>
             <a:fld id="{757CC0B5-646B-0B4A-9522-E76724BE3B7A}" type="datetime1">
               <a:rPr lang="en-US" smtClean="0"/>
-              <a:t>7/15/23</a:t>
+              <a:t>8/1/23</a:t>
             </a:fld>
             <a:endParaRPr lang="en-GB"/>
           </a:p>
@@ -5454,7 +5119,7 @@
           <a:p>
             <a:fld id="{8BAEE047-31F9-0242-9341-CE6AC3E0227F}" type="datetime1">
               <a:rPr lang="en-US" smtClean="0"/>
-              <a:t>7/15/23</a:t>
+              <a:t>8/1/23</a:t>
             </a:fld>
             <a:endParaRPr lang="en-GB"/>
           </a:p>
@@ -5638,7 +5303,7 @@
           <a:p>
             <a:fld id="{65B7B1D7-BB11-F54D-A0BB-178FAC83190A}" type="datetime1">
               <a:rPr lang="en-US" smtClean="0"/>
-              <a:t>7/15/23</a:t>
+              <a:t>8/1/23</a:t>
             </a:fld>
             <a:endParaRPr lang="en-GB"/>
           </a:p>
@@ -5834,7 +5499,7 @@
           <a:p>
             <a:fld id="{571E2F0B-41C2-7F4E-88A3-5FC661CE0B52}" type="datetime1">
               <a:rPr lang="en-US" smtClean="0"/>
-              <a:t>7/15/23</a:t>
+              <a:t>8/1/23</a:t>
             </a:fld>
             <a:endParaRPr lang="en-GB"/>
           </a:p>
@@ -5932,7 +5597,7 @@
           <p:cNvPr id="7" name="Title 6">
             <a:extLst>
               <a:ext uri="{FF2B5EF4-FFF2-40B4-BE49-F238E27FC236}">
-                <a16:creationId xmlns:a16="http://schemas.microsoft.com/office/drawing/2014/main" id="{5E6D7B3A-7233-7946-9B42-7C7AAC3836E5}"/>
+                <a16:creationId xmlns:a16="http://schemas.microsoft.com/office/drawing/2014/main" id="{C3AABEED-29C8-3E4A-B4D5-24E7B3E2A730}"/>
               </a:ext>
             </a:extLst>
           </p:cNvPr>
@@ -5950,7 +5615,7 @@
           <a:p>
             <a:r>
               <a:rPr lang="en-GB" dirty="0"/>
-              <a:t>The Hook</a:t>
+              <a:t>Training Topic</a:t>
             </a:r>
           </a:p>
         </p:txBody>
@@ -5960,7 +5625,7 @@
           <p:cNvPr id="8" name="Text Placeholder 7">
             <a:extLst>
               <a:ext uri="{FF2B5EF4-FFF2-40B4-BE49-F238E27FC236}">
-                <a16:creationId xmlns:a16="http://schemas.microsoft.com/office/drawing/2014/main" id="{4E7F1220-C2BE-294E-A7BC-E1F881FB9911}"/>
+                <a16:creationId xmlns:a16="http://schemas.microsoft.com/office/drawing/2014/main" id="{098C12E1-C6AE-9948-89E1-C4C3B98CD4CD}"/>
               </a:ext>
             </a:extLst>
           </p:cNvPr>
@@ -5985,7 +5650,7 @@
           <p:cNvPr id="4" name="Date Placeholder 3">
             <a:extLst>
               <a:ext uri="{FF2B5EF4-FFF2-40B4-BE49-F238E27FC236}">
-                <a16:creationId xmlns:a16="http://schemas.microsoft.com/office/drawing/2014/main" id="{A381F575-2998-C541-AF3E-DE05EE759B29}"/>
+                <a16:creationId xmlns:a16="http://schemas.microsoft.com/office/drawing/2014/main" id="{8E7F7C5D-FBF1-1E4E-A8E5-303BFCF39B5B}"/>
               </a:ext>
             </a:extLst>
           </p:cNvPr>
@@ -6003,7 +5668,7 @@
           <a:p>
             <a:fld id="{32F894A0-9D35-9748-BD54-62903A696867}" type="datetime1">
               <a:rPr lang="en-US" smtClean="0"/>
-              <a:t>7/15/23</a:t>
+              <a:t>8/1/23</a:t>
             </a:fld>
             <a:endParaRPr lang="en-GB"/>
           </a:p>
@@ -6014,7 +5679,7 @@
           <p:cNvPr id="5" name="Footer Placeholder 4">
             <a:extLst>
               <a:ext uri="{FF2B5EF4-FFF2-40B4-BE49-F238E27FC236}">
-                <a16:creationId xmlns:a16="http://schemas.microsoft.com/office/drawing/2014/main" id="{D2FCF05F-78CB-654D-AEDA-EC7B1F58AF69}"/>
+                <a16:creationId xmlns:a16="http://schemas.microsoft.com/office/drawing/2014/main" id="{06EDAE72-7768-904A-80D7-4EFB052441AB}"/>
               </a:ext>
             </a:extLst>
           </p:cNvPr>
@@ -6042,7 +5707,7 @@
           <p:cNvPr id="6" name="Slide Number Placeholder 5">
             <a:extLst>
               <a:ext uri="{FF2B5EF4-FFF2-40B4-BE49-F238E27FC236}">
-                <a16:creationId xmlns:a16="http://schemas.microsoft.com/office/drawing/2014/main" id="{40D6280D-D0D5-0F4D-A19E-CD5BA059C6AE}"/>
+                <a16:creationId xmlns:a16="http://schemas.microsoft.com/office/drawing/2014/main" id="{539043DD-B79D-064E-85FC-F3EFCEC575E1}"/>
               </a:ext>
             </a:extLst>
           </p:cNvPr>
@@ -6069,7 +5734,7 @@
     </p:spTree>
     <p:extLst>
       <p:ext uri="{BB962C8B-B14F-4D97-AF65-F5344CB8AC3E}">
-        <p14:creationId xmlns:p14="http://schemas.microsoft.com/office/powerpoint/2010/main" val="1952960373"/>
+        <p14:creationId xmlns:p14="http://schemas.microsoft.com/office/powerpoint/2010/main" val="2264563980"/>
       </p:ext>
     </p:extLst>
   </p:cSld>
@@ -6101,7 +5766,7 @@
           <p:cNvPr id="2" name="Title 1">
             <a:extLst>
               <a:ext uri="{FF2B5EF4-FFF2-40B4-BE49-F238E27FC236}">
-                <a16:creationId xmlns:a16="http://schemas.microsoft.com/office/drawing/2014/main" id="{C1B9180E-2E36-7B4F-BD19-3B315DC8468E}"/>
+                <a16:creationId xmlns:a16="http://schemas.microsoft.com/office/drawing/2014/main" id="{897FBCEE-D64F-5641-910A-92A6219F8D4E}"/>
               </a:ext>
             </a:extLst>
           </p:cNvPr>
@@ -6117,7 +5782,10 @@
           <a:bodyPr/>
           <a:lstStyle/>
           <a:p>
-            <a:endParaRPr lang="en-GB" dirty="0"/>
+            <a:r>
+              <a:rPr lang="en-GB" dirty="0"/>
+              <a:t>Information</a:t>
+            </a:r>
           </a:p>
         </p:txBody>
       </p:sp>
@@ -6126,7 +5794,7 @@
           <p:cNvPr id="3" name="Content Placeholder 2">
             <a:extLst>
               <a:ext uri="{FF2B5EF4-FFF2-40B4-BE49-F238E27FC236}">
-                <a16:creationId xmlns:a16="http://schemas.microsoft.com/office/drawing/2014/main" id="{9D4B854E-9A19-B743-95F0-7E8ACCCBDB7E}"/>
+                <a16:creationId xmlns:a16="http://schemas.microsoft.com/office/drawing/2014/main" id="{8E54BA21-69BB-3641-AE90-2208835E8D03}"/>
               </a:ext>
             </a:extLst>
           </p:cNvPr>
@@ -6151,7 +5819,7 @@
           <p:cNvPr id="4" name="Date Placeholder 3">
             <a:extLst>
               <a:ext uri="{FF2B5EF4-FFF2-40B4-BE49-F238E27FC236}">
-                <a16:creationId xmlns:a16="http://schemas.microsoft.com/office/drawing/2014/main" id="{9FDC9320-98A1-0147-81C9-54AB7A5BF0E8}"/>
+                <a16:creationId xmlns:a16="http://schemas.microsoft.com/office/drawing/2014/main" id="{D4CEBDDB-E691-4445-A635-06D0B5E8A3AB}"/>
               </a:ext>
             </a:extLst>
           </p:cNvPr>
@@ -6169,7 +5837,7 @@
           <a:p>
             <a:fld id="{32F894A0-9D35-9748-BD54-62903A696867}" type="datetime1">
               <a:rPr lang="en-US" smtClean="0"/>
-              <a:t>7/15/23</a:t>
+              <a:t>8/1/23</a:t>
             </a:fld>
             <a:endParaRPr lang="en-GB"/>
           </a:p>
@@ -6180,7 +5848,7 @@
           <p:cNvPr id="5" name="Footer Placeholder 4">
             <a:extLst>
               <a:ext uri="{FF2B5EF4-FFF2-40B4-BE49-F238E27FC236}">
-                <a16:creationId xmlns:a16="http://schemas.microsoft.com/office/drawing/2014/main" id="{A739523F-C8BD-1848-967B-0E07FA5EBECA}"/>
+                <a16:creationId xmlns:a16="http://schemas.microsoft.com/office/drawing/2014/main" id="{1734FBD2-EDDD-7A4E-BCB6-1EF08C25E781}"/>
               </a:ext>
             </a:extLst>
           </p:cNvPr>
@@ -6208,7 +5876,7 @@
           <p:cNvPr id="6" name="Slide Number Placeholder 5">
             <a:extLst>
               <a:ext uri="{FF2B5EF4-FFF2-40B4-BE49-F238E27FC236}">
-                <a16:creationId xmlns:a16="http://schemas.microsoft.com/office/drawing/2014/main" id="{C85DAAF0-E6BF-8C4C-9002-5D99593357A8}"/>
+                <a16:creationId xmlns:a16="http://schemas.microsoft.com/office/drawing/2014/main" id="{52A1BB2B-0CD9-9542-BCF7-35EAF41A6E2D}"/>
               </a:ext>
             </a:extLst>
           </p:cNvPr>
@@ -6235,7 +5903,7 @@
     </p:spTree>
     <p:extLst>
       <p:ext uri="{BB962C8B-B14F-4D97-AF65-F5344CB8AC3E}">
-        <p14:creationId xmlns:p14="http://schemas.microsoft.com/office/powerpoint/2010/main" val="1758048767"/>
+        <p14:creationId xmlns:p14="http://schemas.microsoft.com/office/powerpoint/2010/main" val="1009079400"/>
       </p:ext>
     </p:extLst>
   </p:cSld>
@@ -6264,10 +5932,10 @@
       </p:grpSpPr>
       <p:sp>
         <p:nvSpPr>
-          <p:cNvPr id="7" name="Title 6">
-            <a:extLst>
-              <a:ext uri="{FF2B5EF4-FFF2-40B4-BE49-F238E27FC236}">
-                <a16:creationId xmlns:a16="http://schemas.microsoft.com/office/drawing/2014/main" id="{C3AABEED-29C8-3E4A-B4D5-24E7B3E2A730}"/>
+          <p:cNvPr id="2" name="Title 1">
+            <a:extLst>
+              <a:ext uri="{FF2B5EF4-FFF2-40B4-BE49-F238E27FC236}">
+                <a16:creationId xmlns:a16="http://schemas.microsoft.com/office/drawing/2014/main" id="{A547E63D-4C71-844B-A424-496C03757606}"/>
               </a:ext>
             </a:extLst>
           </p:cNvPr>
@@ -6285,25 +5953,25 @@
           <a:p>
             <a:r>
               <a:rPr lang="en-GB" dirty="0"/>
-              <a:t>Training Topic</a:t>
-            </a:r>
-          </a:p>
-        </p:txBody>
-      </p:sp>
-      <p:sp>
-        <p:nvSpPr>
-          <p:cNvPr id="8" name="Text Placeholder 7">
-            <a:extLst>
-              <a:ext uri="{FF2B5EF4-FFF2-40B4-BE49-F238E27FC236}">
-                <a16:creationId xmlns:a16="http://schemas.microsoft.com/office/drawing/2014/main" id="{098C12E1-C6AE-9948-89E1-C4C3B98CD4CD}"/>
-              </a:ext>
-            </a:extLst>
-          </p:cNvPr>
-          <p:cNvSpPr>
-            <a:spLocks noGrp="1"/>
-          </p:cNvSpPr>
-          <p:nvPr>
-            <p:ph type="body" idx="1"/>
+              <a:t>Example</a:t>
+            </a:r>
+          </a:p>
+        </p:txBody>
+      </p:sp>
+      <p:sp>
+        <p:nvSpPr>
+          <p:cNvPr id="3" name="Content Placeholder 2">
+            <a:extLst>
+              <a:ext uri="{FF2B5EF4-FFF2-40B4-BE49-F238E27FC236}">
+                <a16:creationId xmlns:a16="http://schemas.microsoft.com/office/drawing/2014/main" id="{B5523B50-2D67-5845-96CC-BC2354930DEF}"/>
+              </a:ext>
+            </a:extLst>
+          </p:cNvPr>
+          <p:cNvSpPr>
+            <a:spLocks noGrp="1"/>
+          </p:cNvSpPr>
+          <p:nvPr>
+            <p:ph idx="1"/>
           </p:nvPr>
         </p:nvSpPr>
         <p:spPr/>
@@ -6320,7 +5988,7 @@
           <p:cNvPr id="4" name="Date Placeholder 3">
             <a:extLst>
               <a:ext uri="{FF2B5EF4-FFF2-40B4-BE49-F238E27FC236}">
-                <a16:creationId xmlns:a16="http://schemas.microsoft.com/office/drawing/2014/main" id="{8E7F7C5D-FBF1-1E4E-A8E5-303BFCF39B5B}"/>
+                <a16:creationId xmlns:a16="http://schemas.microsoft.com/office/drawing/2014/main" id="{6AD20448-75EA-B34B-BA3B-69145D18214D}"/>
               </a:ext>
             </a:extLst>
           </p:cNvPr>
@@ -6338,7 +6006,7 @@
           <a:p>
             <a:fld id="{32F894A0-9D35-9748-BD54-62903A696867}" type="datetime1">
               <a:rPr lang="en-US" smtClean="0"/>
-              <a:t>7/15/23</a:t>
+              <a:t>8/1/23</a:t>
             </a:fld>
             <a:endParaRPr lang="en-GB"/>
           </a:p>
@@ -6349,7 +6017,7 @@
           <p:cNvPr id="5" name="Footer Placeholder 4">
             <a:extLst>
               <a:ext uri="{FF2B5EF4-FFF2-40B4-BE49-F238E27FC236}">
-                <a16:creationId xmlns:a16="http://schemas.microsoft.com/office/drawing/2014/main" id="{06EDAE72-7768-904A-80D7-4EFB052441AB}"/>
+                <a16:creationId xmlns:a16="http://schemas.microsoft.com/office/drawing/2014/main" id="{AA3F439F-0A50-F24F-8D90-C3F1A7C7EE37}"/>
               </a:ext>
             </a:extLst>
           </p:cNvPr>
@@ -6377,7 +6045,7 @@
           <p:cNvPr id="6" name="Slide Number Placeholder 5">
             <a:extLst>
               <a:ext uri="{FF2B5EF4-FFF2-40B4-BE49-F238E27FC236}">
-                <a16:creationId xmlns:a16="http://schemas.microsoft.com/office/drawing/2014/main" id="{539043DD-B79D-064E-85FC-F3EFCEC575E1}"/>
+                <a16:creationId xmlns:a16="http://schemas.microsoft.com/office/drawing/2014/main" id="{0A70E8CC-1EB2-B745-A4DF-DAEB6276F164}"/>
               </a:ext>
             </a:extLst>
           </p:cNvPr>
@@ -6404,7 +6072,7 @@
     </p:spTree>
     <p:extLst>
       <p:ext uri="{BB962C8B-B14F-4D97-AF65-F5344CB8AC3E}">
-        <p14:creationId xmlns:p14="http://schemas.microsoft.com/office/powerpoint/2010/main" val="2264563980"/>
+        <p14:creationId xmlns:p14="http://schemas.microsoft.com/office/powerpoint/2010/main" val="2093542985"/>
       </p:ext>
     </p:extLst>
   </p:cSld>
@@ -6436,7 +6104,7 @@
           <p:cNvPr id="2" name="Title 1">
             <a:extLst>
               <a:ext uri="{FF2B5EF4-FFF2-40B4-BE49-F238E27FC236}">
-                <a16:creationId xmlns:a16="http://schemas.microsoft.com/office/drawing/2014/main" id="{897FBCEE-D64F-5641-910A-92A6219F8D4E}"/>
+                <a16:creationId xmlns:a16="http://schemas.microsoft.com/office/drawing/2014/main" id="{220426A6-1BD4-DF4E-B069-73996DA9E04D}"/>
               </a:ext>
             </a:extLst>
           </p:cNvPr>
@@ -6454,7 +6122,7 @@
           <a:p>
             <a:r>
               <a:rPr lang="en-GB" dirty="0"/>
-              <a:t>Information</a:t>
+              <a:t>Activity</a:t>
             </a:r>
           </a:p>
         </p:txBody>
@@ -6464,7 +6132,7 @@
           <p:cNvPr id="3" name="Content Placeholder 2">
             <a:extLst>
               <a:ext uri="{FF2B5EF4-FFF2-40B4-BE49-F238E27FC236}">
-                <a16:creationId xmlns:a16="http://schemas.microsoft.com/office/drawing/2014/main" id="{8E54BA21-69BB-3641-AE90-2208835E8D03}"/>
+                <a16:creationId xmlns:a16="http://schemas.microsoft.com/office/drawing/2014/main" id="{23317488-EBEC-0640-B709-52C48BE47CB9}"/>
               </a:ext>
             </a:extLst>
           </p:cNvPr>
@@ -6489,7 +6157,7 @@
           <p:cNvPr id="4" name="Date Placeholder 3">
             <a:extLst>
               <a:ext uri="{FF2B5EF4-FFF2-40B4-BE49-F238E27FC236}">
-                <a16:creationId xmlns:a16="http://schemas.microsoft.com/office/drawing/2014/main" id="{D4CEBDDB-E691-4445-A635-06D0B5E8A3AB}"/>
+                <a16:creationId xmlns:a16="http://schemas.microsoft.com/office/drawing/2014/main" id="{F5FAA34B-D379-7449-97DC-4B149AA575B8}"/>
               </a:ext>
             </a:extLst>
           </p:cNvPr>
@@ -6507,7 +6175,7 @@
           <a:p>
             <a:fld id="{32F894A0-9D35-9748-BD54-62903A696867}" type="datetime1">
               <a:rPr lang="en-US" smtClean="0"/>
-              <a:t>7/15/23</a:t>
+              <a:t>8/1/23</a:t>
             </a:fld>
             <a:endParaRPr lang="en-GB"/>
           </a:p>
@@ -6518,7 +6186,7 @@
           <p:cNvPr id="5" name="Footer Placeholder 4">
             <a:extLst>
               <a:ext uri="{FF2B5EF4-FFF2-40B4-BE49-F238E27FC236}">
-                <a16:creationId xmlns:a16="http://schemas.microsoft.com/office/drawing/2014/main" id="{1734FBD2-EDDD-7A4E-BCB6-1EF08C25E781}"/>
+                <a16:creationId xmlns:a16="http://schemas.microsoft.com/office/drawing/2014/main" id="{33492951-90AC-544B-87D2-A85AD96E2D05}"/>
               </a:ext>
             </a:extLst>
           </p:cNvPr>
@@ -6546,7 +6214,7 @@
           <p:cNvPr id="6" name="Slide Number Placeholder 5">
             <a:extLst>
               <a:ext uri="{FF2B5EF4-FFF2-40B4-BE49-F238E27FC236}">
-                <a16:creationId xmlns:a16="http://schemas.microsoft.com/office/drawing/2014/main" id="{52A1BB2B-0CD9-9542-BCF7-35EAF41A6E2D}"/>
+                <a16:creationId xmlns:a16="http://schemas.microsoft.com/office/drawing/2014/main" id="{B7E70566-0091-C342-AAA5-E54030FAF150}"/>
               </a:ext>
             </a:extLst>
           </p:cNvPr>
@@ -6573,7 +6241,7 @@
     </p:spTree>
     <p:extLst>
       <p:ext uri="{BB962C8B-B14F-4D97-AF65-F5344CB8AC3E}">
-        <p14:creationId xmlns:p14="http://schemas.microsoft.com/office/powerpoint/2010/main" val="1009079400"/>
+        <p14:creationId xmlns:p14="http://schemas.microsoft.com/office/powerpoint/2010/main" val="3011264620"/>
       </p:ext>
     </p:extLst>
   </p:cSld>

</xml_diff>